<commit_message>
Update gamma in SVM presentation
</commit_message>
<xml_diff>
--- a/presentations/SVM.pptx
+++ b/presentations/SVM.pptx
@@ -301,7 +301,7 @@
           <a:p>
             <a:fld id="{F2853615-BFDE-46DE-814C-47EC6EF6D371}" type="datetimeFigureOut">
               <a:rPr lang="el-GR" smtClean="0"/>
-              <a:t>20/9/2018</a:t>
+              <a:t>16/2/2019</a:t>
             </a:fld>
             <a:endParaRPr lang="el-GR"/>
           </a:p>
@@ -501,7 +501,7 @@
           <a:p>
             <a:fld id="{F2853615-BFDE-46DE-814C-47EC6EF6D371}" type="datetimeFigureOut">
               <a:rPr lang="el-GR" smtClean="0"/>
-              <a:t>20/9/2018</a:t>
+              <a:t>16/2/2019</a:t>
             </a:fld>
             <a:endParaRPr lang="el-GR"/>
           </a:p>
@@ -676,7 +676,7 @@
           <a:p>
             <a:fld id="{F2853615-BFDE-46DE-814C-47EC6EF6D371}" type="datetimeFigureOut">
               <a:rPr lang="el-GR" smtClean="0"/>
-              <a:t>20/9/2018</a:t>
+              <a:t>16/2/2019</a:t>
             </a:fld>
             <a:endParaRPr lang="el-GR"/>
           </a:p>
@@ -841,7 +841,7 @@
           <a:p>
             <a:fld id="{F2853615-BFDE-46DE-814C-47EC6EF6D371}" type="datetimeFigureOut">
               <a:rPr lang="el-GR" smtClean="0"/>
-              <a:t>20/9/2018</a:t>
+              <a:t>16/2/2019</a:t>
             </a:fld>
             <a:endParaRPr lang="el-GR"/>
           </a:p>
@@ -980,7 +980,7 @@
           <a:p>
             <a:fld id="{F2853615-BFDE-46DE-814C-47EC6EF6D371}" type="datetimeFigureOut">
               <a:rPr lang="el-GR" smtClean="0"/>
-              <a:t>20/9/2018</a:t>
+              <a:t>16/2/2019</a:t>
             </a:fld>
             <a:endParaRPr lang="el-GR"/>
           </a:p>
@@ -1298,7 +1298,7 @@
           <a:p>
             <a:fld id="{F2853615-BFDE-46DE-814C-47EC6EF6D371}" type="datetimeFigureOut">
               <a:rPr lang="el-GR" smtClean="0"/>
-              <a:t>20/9/2018</a:t>
+              <a:t>16/2/2019</a:t>
             </a:fld>
             <a:endParaRPr lang="el-GR"/>
           </a:p>
@@ -1764,7 +1764,7 @@
           <a:p>
             <a:fld id="{F2853615-BFDE-46DE-814C-47EC6EF6D371}" type="datetimeFigureOut">
               <a:rPr lang="el-GR" smtClean="0"/>
-              <a:t>20/9/2018</a:t>
+              <a:t>16/2/2019</a:t>
             </a:fld>
             <a:endParaRPr lang="el-GR"/>
           </a:p>
@@ -1912,7 +1912,7 @@
           <a:p>
             <a:fld id="{F2853615-BFDE-46DE-814C-47EC6EF6D371}" type="datetimeFigureOut">
               <a:rPr lang="el-GR" smtClean="0"/>
-              <a:t>20/9/2018</a:t>
+              <a:t>16/2/2019</a:t>
             </a:fld>
             <a:endParaRPr lang="el-GR"/>
           </a:p>
@@ -2002,7 +2002,7 @@
           <a:p>
             <a:fld id="{F2853615-BFDE-46DE-814C-47EC6EF6D371}" type="datetimeFigureOut">
               <a:rPr lang="el-GR" smtClean="0"/>
-              <a:t>20/9/2018</a:t>
+              <a:t>16/2/2019</a:t>
             </a:fld>
             <a:endParaRPr lang="el-GR"/>
           </a:p>
@@ -2276,7 +2276,7 @@
           <a:p>
             <a:fld id="{F2853615-BFDE-46DE-814C-47EC6EF6D371}" type="datetimeFigureOut">
               <a:rPr lang="el-GR" smtClean="0"/>
-              <a:t>20/9/2018</a:t>
+              <a:t>16/2/2019</a:t>
             </a:fld>
             <a:endParaRPr lang="el-GR"/>
           </a:p>
@@ -2581,7 +2581,7 @@
           <a:p>
             <a:fld id="{F2853615-BFDE-46DE-814C-47EC6EF6D371}" type="datetimeFigureOut">
               <a:rPr lang="el-GR" smtClean="0"/>
-              <a:t>20/9/2018</a:t>
+              <a:t>16/2/2019</a:t>
             </a:fld>
             <a:endParaRPr lang="el-GR"/>
           </a:p>
@@ -2879,7 +2879,7 @@
           <a:p>
             <a:fld id="{F2853615-BFDE-46DE-814C-47EC6EF6D371}" type="datetimeFigureOut">
               <a:rPr lang="el-GR" smtClean="0"/>
-              <a:t>20/9/2018</a:t>
+              <a:t>16/2/2019</a:t>
             </a:fld>
             <a:endParaRPr lang="el-GR"/>
           </a:p>
@@ -3560,7 +3560,7 @@
           <a:graphicData uri="http://schemas.openxmlformats.org/presentationml/2006/ole">
             <mc:AlternateContent xmlns:mc="http://schemas.openxmlformats.org/markup-compatibility/2006">
               <mc:Choice xmlns:v="urn:schemas-microsoft-com:vml" Requires="v">
-                <p:oleObj spid="_x0000_s5151" name="Equation" r:id="rId4" imgW="444240" imgH="393480" progId="Equation.DSMT4">
+                <p:oleObj spid="_x0000_s5154" name="Equation" r:id="rId4" imgW="444240" imgH="393480" progId="Equation.DSMT4">
                   <p:embed/>
                 </p:oleObj>
               </mc:Choice>
@@ -3840,7 +3840,7 @@
           <a:graphicData uri="http://schemas.openxmlformats.org/presentationml/2006/ole">
             <mc:AlternateContent xmlns:mc="http://schemas.openxmlformats.org/markup-compatibility/2006">
               <mc:Choice xmlns:v="urn:schemas-microsoft-com:vml" Requires="v">
-                <p:oleObj spid="_x0000_s6174" name="Equation" r:id="rId3" imgW="977760" imgH="419040" progId="Equation.DSMT4">
+                <p:oleObj spid="_x0000_s6177" name="Equation" r:id="rId3" imgW="977760" imgH="419040" progId="Equation.DSMT4">
                   <p:embed/>
                 </p:oleObj>
               </mc:Choice>
@@ -4419,7 +4419,7 @@
           <a:graphicData uri="http://schemas.openxmlformats.org/presentationml/2006/ole">
             <mc:AlternateContent xmlns:mc="http://schemas.openxmlformats.org/markup-compatibility/2006">
               <mc:Choice xmlns:v="urn:schemas-microsoft-com:vml" Requires="v">
-                <p:oleObj spid="_x0000_s7196" name="Equation" r:id="rId4" imgW="1371600" imgH="279360" progId="Equation.DSMT4">
+                <p:oleObj spid="_x0000_s7199" name="Equation" r:id="rId4" imgW="1371600" imgH="279360" progId="Equation.DSMT4">
                   <p:embed/>
                 </p:oleObj>
               </mc:Choice>
@@ -4616,11 +4616,7 @@
           <a:p>
             <a:r>
               <a:rPr lang="en-GB" sz="1200" dirty="0" smtClean="0"/>
-              <a:t>Source: </a:t>
-            </a:r>
-            <a:r>
-              <a:rPr lang="en-GB" sz="1200" dirty="0" smtClean="0"/>
-              <a:t>http://beta.cambridgespark.com/courses/jpm/05-module.html</a:t>
+              <a:t>Source: http://beta.cambridgespark.com/courses/jpm/05-module.html</a:t>
             </a:r>
             <a:endParaRPr lang="el-GR" sz="1200" dirty="0"/>
           </a:p>
@@ -4648,7 +4644,7 @@
           <a:graphicData uri="http://schemas.openxmlformats.org/presentationml/2006/ole">
             <mc:AlternateContent xmlns:mc="http://schemas.openxmlformats.org/markup-compatibility/2006">
               <mc:Choice xmlns:v="urn:schemas-microsoft-com:vml" Requires="v">
-                <p:oleObj spid="_x0000_s8263" name="Equation" r:id="rId3" imgW="901440" imgH="253800" progId="Equation.DSMT4">
+                <p:oleObj spid="_x0000_s8272" name="Equation" r:id="rId3" imgW="901440" imgH="253800" progId="Equation.DSMT4">
                   <p:embed/>
                 </p:oleObj>
               </mc:Choice>
@@ -4907,7 +4903,7 @@
           <a:graphicData uri="http://schemas.openxmlformats.org/presentationml/2006/ole">
             <mc:AlternateContent xmlns:mc="http://schemas.openxmlformats.org/markup-compatibility/2006">
               <mc:Choice xmlns:v="urn:schemas-microsoft-com:vml" Requires="v">
-                <p:oleObj spid="_x0000_s8264" name="Equation" r:id="rId7" imgW="1269720" imgH="304560" progId="Equation.DSMT4">
+                <p:oleObj spid="_x0000_s8273" name="Equation" r:id="rId7" imgW="1269720" imgH="304560" progId="Equation.DSMT4">
                   <p:embed/>
                 </p:oleObj>
               </mc:Choice>
@@ -4990,7 +4986,7 @@
           <a:graphicData uri="http://schemas.openxmlformats.org/presentationml/2006/ole">
             <mc:AlternateContent xmlns:mc="http://schemas.openxmlformats.org/markup-compatibility/2006">
               <mc:Choice xmlns:v="urn:schemas-microsoft-com:vml" Requires="v">
-                <p:oleObj spid="_x0000_s8265" name="Equation" r:id="rId9" imgW="1206360" imgH="380880" progId="Equation.DSMT4">
+                <p:oleObj spid="_x0000_s8274" name="Equation" r:id="rId9" imgW="1206360" imgH="380880" progId="Equation.DSMT4">
                   <p:embed/>
                 </p:oleObj>
               </mc:Choice>
@@ -5154,7 +5150,7 @@
                   <a:srgbClr val="629DD1"/>
                 </a:solidFill>
               </a:rPr>
-              <a:t>2</a:t>
+              <a:t>1/2</a:t>
             </a:r>
             <a:r>
               <a:rPr lang="el-GR" sz="2000" b="1" i="1" dirty="0" smtClean="0">
@@ -5745,7 +5741,6 @@
               <a:rPr lang="en-US" dirty="0" smtClean="0"/>
               <a:t>Compare the errors</a:t>
             </a:r>
-            <a:endParaRPr lang="en-US" dirty="0" smtClean="0"/>
           </a:p>
           <a:p>
             <a:endParaRPr lang="en-US" dirty="0"/>

</xml_diff>